<commit_message>
Change to unified ppt theme.
</commit_message>
<xml_diff>
--- a/pdf/Week_2/gollwitzercalvary_6791648_102944906_Introduction to machine learning.pptx
+++ b/pdf/Week_2/gollwitzercalvary_6791648_102944906_Introduction to machine learning.pptx
@@ -740,8 +740,8 @@
         </p:nvSpPr>
         <p:spPr>
           <a:xfrm>
-            <a:off x="381300" y="685800"/>
-            <a:ext cx="6096075" cy="3429000"/>
+            <a:off x="381000" y="685800"/>
+            <a:ext cx="6096000" cy="3429000"/>
           </a:xfrm>
           <a:custGeom>
             <a:avLst/>
@@ -844,7 +844,7 @@
         </p:nvSpPr>
         <p:spPr>
           <a:xfrm>
-            <a:off x="381300" y="685800"/>
+            <a:off x="381000" y="685800"/>
             <a:ext cx="6096000" cy="3429000"/>
           </a:xfrm>
           <a:custGeom>
@@ -948,7 +948,7 @@
         </p:nvSpPr>
         <p:spPr>
           <a:xfrm>
-            <a:off x="381300" y="685800"/>
+            <a:off x="381000" y="685800"/>
             <a:ext cx="6096000" cy="3429000"/>
           </a:xfrm>
           <a:custGeom>
@@ -1052,7 +1052,7 @@
         </p:nvSpPr>
         <p:spPr>
           <a:xfrm>
-            <a:off x="381300" y="685800"/>
+            <a:off x="381000" y="685800"/>
             <a:ext cx="6096000" cy="3429000"/>
           </a:xfrm>
           <a:custGeom>
@@ -1156,7 +1156,7 @@
         </p:nvSpPr>
         <p:spPr>
           <a:xfrm>
-            <a:off x="381300" y="685800"/>
+            <a:off x="381000" y="685800"/>
             <a:ext cx="6096000" cy="3429000"/>
           </a:xfrm>
           <a:custGeom>
@@ -1260,7 +1260,7 @@
         </p:nvSpPr>
         <p:spPr>
           <a:xfrm>
-            <a:off x="381300" y="685800"/>
+            <a:off x="381000" y="685800"/>
             <a:ext cx="6096000" cy="3429000"/>
           </a:xfrm>
           <a:custGeom>
@@ -1364,7 +1364,7 @@
         </p:nvSpPr>
         <p:spPr>
           <a:xfrm>
-            <a:off x="381300" y="685800"/>
+            <a:off x="381000" y="685800"/>
             <a:ext cx="6096000" cy="3429000"/>
           </a:xfrm>
           <a:custGeom>
@@ -1468,7 +1468,7 @@
         </p:nvSpPr>
         <p:spPr>
           <a:xfrm>
-            <a:off x="381300" y="685800"/>
+            <a:off x="381000" y="685800"/>
             <a:ext cx="6096000" cy="3429000"/>
           </a:xfrm>
           <a:custGeom>
@@ -1572,7 +1572,7 @@
         </p:nvSpPr>
         <p:spPr>
           <a:xfrm>
-            <a:off x="381300" y="685800"/>
+            <a:off x="381000" y="685800"/>
             <a:ext cx="6096000" cy="3429000"/>
           </a:xfrm>
           <a:custGeom>
@@ -1676,7 +1676,7 @@
         </p:nvSpPr>
         <p:spPr>
           <a:xfrm>
-            <a:off x="381300" y="685800"/>
+            <a:off x="381000" y="685800"/>
             <a:ext cx="6096000" cy="3429000"/>
           </a:xfrm>
           <a:custGeom>
@@ -1780,7 +1780,7 @@
         </p:nvSpPr>
         <p:spPr>
           <a:xfrm>
-            <a:off x="381300" y="685800"/>
+            <a:off x="381000" y="685800"/>
             <a:ext cx="6096000" cy="3429000"/>
           </a:xfrm>
           <a:custGeom>
@@ -6841,10 +6841,6 @@
           </p:nvPr>
         </p:nvSpPr>
         <p:spPr>
-          <a:xfrm>
-            <a:off x="311700" y="445025"/>
-            <a:ext cx="8520600" cy="572700"/>
-          </a:xfrm>
           <a:prstGeom prst="rect">
             <a:avLst/>
           </a:prstGeom>
@@ -7082,10 +7078,6 @@
           </p:nvPr>
         </p:nvSpPr>
         <p:spPr>
-          <a:xfrm>
-            <a:off x="311700" y="445025"/>
-            <a:ext cx="8520600" cy="572700"/>
-          </a:xfrm>
           <a:prstGeom prst="rect">
             <a:avLst/>
           </a:prstGeom>
@@ -7124,10 +7116,6 @@
           </p:nvPr>
         </p:nvSpPr>
         <p:spPr>
-          <a:xfrm>
-            <a:off x="311700" y="1152475"/>
-            <a:ext cx="8520600" cy="3416400"/>
-          </a:xfrm>
           <a:prstGeom prst="rect">
             <a:avLst/>
           </a:prstGeom>
@@ -7277,10 +7265,6 @@
           </p:nvPr>
         </p:nvSpPr>
         <p:spPr>
-          <a:xfrm>
-            <a:off x="311700" y="445025"/>
-            <a:ext cx="8520600" cy="572700"/>
-          </a:xfrm>
           <a:prstGeom prst="rect">
             <a:avLst/>
           </a:prstGeom>
@@ -7478,10 +7462,6 @@
           </p:nvPr>
         </p:nvSpPr>
         <p:spPr>
-          <a:xfrm>
-            <a:off x="311700" y="445025"/>
-            <a:ext cx="8520600" cy="572700"/>
-          </a:xfrm>
           <a:prstGeom prst="rect">
             <a:avLst/>
           </a:prstGeom>
@@ -7520,10 +7500,6 @@
           </p:nvPr>
         </p:nvSpPr>
         <p:spPr>
-          <a:xfrm>
-            <a:off x="311700" y="1152475"/>
-            <a:ext cx="8520600" cy="3416400"/>
-          </a:xfrm>
           <a:prstGeom prst="rect">
             <a:avLst/>
           </a:prstGeom>
@@ -7759,10 +7735,6 @@
           </p:nvPr>
         </p:nvSpPr>
         <p:spPr>
-          <a:xfrm>
-            <a:off x="311700" y="445025"/>
-            <a:ext cx="8520600" cy="572700"/>
-          </a:xfrm>
           <a:prstGeom prst="rect">
             <a:avLst/>
           </a:prstGeom>
@@ -7801,10 +7773,6 @@
           </p:nvPr>
         </p:nvSpPr>
         <p:spPr>
-          <a:xfrm>
-            <a:off x="311700" y="1152475"/>
-            <a:ext cx="8520600" cy="3416400"/>
-          </a:xfrm>
           <a:prstGeom prst="rect">
             <a:avLst/>
           </a:prstGeom>
@@ -8089,10 +8057,6 @@
           </p:nvPr>
         </p:nvSpPr>
         <p:spPr>
-          <a:xfrm>
-            <a:off x="311700" y="445025"/>
-            <a:ext cx="8520600" cy="572700"/>
-          </a:xfrm>
           <a:prstGeom prst="rect">
             <a:avLst/>
           </a:prstGeom>
@@ -8322,10 +8286,6 @@
           </p:nvPr>
         </p:nvSpPr>
         <p:spPr>
-          <a:xfrm>
-            <a:off x="311700" y="445025"/>
-            <a:ext cx="8520600" cy="572700"/>
-          </a:xfrm>
           <a:prstGeom prst="rect">
             <a:avLst/>
           </a:prstGeom>
@@ -8552,13 +8512,13 @@
             <a:spLocks noGrp="1"/>
           </p:cNvSpPr>
           <p:nvPr>
-            <p:ph type="body" idx="1"/>
+            <p:ph type="body" idx="4294967295"/>
           </p:nvPr>
         </p:nvSpPr>
         <p:spPr>
           <a:xfrm>
-            <a:off x="2661900" y="1089225"/>
-            <a:ext cx="3479100" cy="2517900"/>
+            <a:off x="0" y="1089025"/>
+            <a:ext cx="3478213" cy="2517775"/>
           </a:xfrm>
           <a:prstGeom prst="rect">
             <a:avLst/>
@@ -8811,10 +8771,6 @@
           </p:nvPr>
         </p:nvSpPr>
         <p:spPr>
-          <a:xfrm>
-            <a:off x="311700" y="445025"/>
-            <a:ext cx="8520600" cy="572700"/>
-          </a:xfrm>
           <a:prstGeom prst="rect">
             <a:avLst/>
           </a:prstGeom>
@@ -10197,10 +10153,6 @@
           </p:nvPr>
         </p:nvSpPr>
         <p:spPr>
-          <a:xfrm>
-            <a:off x="311700" y="445025"/>
-            <a:ext cx="8520600" cy="572700"/>
-          </a:xfrm>
           <a:prstGeom prst="rect">
             <a:avLst/>
           </a:prstGeom>

</xml_diff>